<commit_message>
/ ‘Extended Campuses/EC CSS HTML Presentation.pptx’
</commit_message>
<xml_diff>
--- a/Extended Campuses/EC CSS HTML Presentation.pptx
+++ b/Extended Campuses/EC CSS HTML Presentation.pptx
@@ -5919,13 +5919,34 @@
           <a:p>
             <a:r>
               <a:rPr lang="en-US" dirty="0" smtClean="0"/>
-              <a:t>Best Practices</a:t>
-            </a:r>
-          </a:p>
-          <a:p>
-            <a:r>
-              <a:rPr lang="en-US" dirty="0" smtClean="0"/>
-              <a:t>Where to Start?</a:t>
+              <a:t>Best </a:t>
+            </a:r>
+            <a:r>
+              <a:rPr lang="en-US" dirty="0" smtClean="0"/>
+              <a:t>Practices</a:t>
+            </a:r>
+          </a:p>
+          <a:p>
+            <a:r>
+              <a:rPr lang="en-US" dirty="0" smtClean="0"/>
+              <a:t>Resources</a:t>
+            </a:r>
+            <a:endParaRPr lang="en-US" dirty="0" smtClean="0"/>
+          </a:p>
+          <a:p>
+            <a:r>
+              <a:rPr lang="en-US" dirty="0" smtClean="0"/>
+              <a:t>Where </a:t>
+            </a:r>
+            <a:r>
+              <a:rPr lang="en-US" dirty="0" smtClean="0"/>
+              <a:t>to Start?</a:t>
+            </a:r>
+          </a:p>
+          <a:p>
+            <a:r>
+              <a:rPr lang="en-US" dirty="0" smtClean="0"/>
+              <a:t>Questions</a:t>
             </a:r>
             <a:endParaRPr lang="en-US" dirty="0"/>
           </a:p>

</xml_diff>